<commit_message>
nuove modifiche e R_0
</commit_message>
<xml_diff>
--- a/Latex/bozze_word/SIRS.pptx
+++ b/Latex/bozze_word/SIRS.pptx
@@ -104,6 +104,11 @@
       </a:defRPr>
     </a:lvl9pPr>
   </p:defaultTextStyle>
+  <p:extLst>
+    <p:ext uri="{EFAFB233-063F-42B5-8137-9DF3F51BA10A}">
+      <p15:sldGuideLst xmlns:p15="http://schemas.microsoft.com/office/powerpoint/2012/main"/>
+    </p:ext>
+  </p:extLst>
 </p:presentation>
 </file>
 
@@ -1067,7 +1072,13 @@
     </dgm:pt>
     <dgm:pt modelId="{C8F85B45-7A8F-4C0D-A7C7-7932FFEC23BD}" type="sibTrans" cxnId="{E5D208AC-7AFA-40CB-B337-DFF1EB28B71A}">
       <dgm:prSet/>
-      <dgm:spPr/>
+      <dgm:spPr>
+        <a:ln w="38100">
+          <a:solidFill>
+            <a:schemeClr val="accent2"/>
+          </a:solidFill>
+        </a:ln>
+      </dgm:spPr>
       <dgm:t>
         <a:bodyPr/>
         <a:lstStyle/>
@@ -1103,7 +1114,13 @@
     </dgm:pt>
     <dgm:pt modelId="{41470D5B-5D67-4351-B34C-42203A564F42}" type="sibTrans" cxnId="{58B13936-26C9-4AE2-9012-DDC0AE9162FE}">
       <dgm:prSet/>
-      <dgm:spPr/>
+      <dgm:spPr>
+        <a:ln w="38100">
+          <a:solidFill>
+            <a:schemeClr val="accent3"/>
+          </a:solidFill>
+        </a:ln>
+      </dgm:spPr>
       <dgm:t>
         <a:bodyPr/>
         <a:lstStyle/>
@@ -1139,7 +1156,13 @@
     </dgm:pt>
     <dgm:pt modelId="{2AFC7D1A-5D13-4CED-83A5-3B275D56D6DA}" type="sibTrans" cxnId="{0472C708-C5FD-472E-B23A-B66F7C806AFF}">
       <dgm:prSet/>
-      <dgm:spPr/>
+      <dgm:spPr>
+        <a:ln w="38100">
+          <a:solidFill>
+            <a:schemeClr val="accent4"/>
+          </a:solidFill>
+        </a:ln>
+      </dgm:spPr>
       <dgm:t>
         <a:bodyPr/>
         <a:lstStyle/>
@@ -1349,14 +1372,9 @@
           </a:pathLst>
         </a:custGeom>
         <a:noFill/>
-        <a:ln w="12700" cap="flat" cmpd="sng" algn="ctr">
+        <a:ln w="38100" cap="flat" cmpd="sng" algn="ctr">
           <a:solidFill>
-            <a:schemeClr val="accent2">
-              <a:hueOff val="0"/>
-              <a:satOff val="0"/>
-              <a:lumOff val="0"/>
-              <a:alphaOff val="0"/>
-            </a:schemeClr>
+            <a:schemeClr val="accent2"/>
           </a:solidFill>
           <a:prstDash val="solid"/>
           <a:miter lim="800000"/>
@@ -1481,14 +1499,9 @@
           </a:pathLst>
         </a:custGeom>
         <a:noFill/>
-        <a:ln w="12700" cap="flat" cmpd="sng" algn="ctr">
+        <a:ln w="38100" cap="flat" cmpd="sng" algn="ctr">
           <a:solidFill>
-            <a:schemeClr val="accent3">
-              <a:hueOff val="0"/>
-              <a:satOff val="0"/>
-              <a:lumOff val="0"/>
-              <a:alphaOff val="0"/>
-            </a:schemeClr>
+            <a:schemeClr val="accent3"/>
           </a:solidFill>
           <a:prstDash val="solid"/>
           <a:miter lim="800000"/>
@@ -1613,14 +1626,9 @@
           </a:pathLst>
         </a:custGeom>
         <a:noFill/>
-        <a:ln w="12700" cap="flat" cmpd="sng" algn="ctr">
+        <a:ln w="38100" cap="flat" cmpd="sng" algn="ctr">
           <a:solidFill>
-            <a:schemeClr val="accent4">
-              <a:hueOff val="0"/>
-              <a:satOff val="0"/>
-              <a:lumOff val="0"/>
-              <a:alphaOff val="0"/>
-            </a:schemeClr>
+            <a:schemeClr val="accent4"/>
           </a:solidFill>
           <a:prstDash val="solid"/>
           <a:miter lim="800000"/>
@@ -3018,7 +3026,7 @@
           <a:p>
             <a:fld id="{7B78D76A-E6D9-4E40-B7B7-0B4399432C2D}" type="datetimeFigureOut">
               <a:rPr lang="en-US" smtClean="0"/>
-              <a:t>6/21/2024</a:t>
+              <a:t>6/26/2024</a:t>
             </a:fld>
             <a:endParaRPr lang="en-US"/>
           </a:p>
@@ -3188,7 +3196,7 @@
           <a:p>
             <a:fld id="{7B78D76A-E6D9-4E40-B7B7-0B4399432C2D}" type="datetimeFigureOut">
               <a:rPr lang="en-US" smtClean="0"/>
-              <a:t>6/21/2024</a:t>
+              <a:t>6/26/2024</a:t>
             </a:fld>
             <a:endParaRPr lang="en-US"/>
           </a:p>
@@ -3368,7 +3376,7 @@
           <a:p>
             <a:fld id="{7B78D76A-E6D9-4E40-B7B7-0B4399432C2D}" type="datetimeFigureOut">
               <a:rPr lang="en-US" smtClean="0"/>
-              <a:t>6/21/2024</a:t>
+              <a:t>6/26/2024</a:t>
             </a:fld>
             <a:endParaRPr lang="en-US"/>
           </a:p>
@@ -3538,7 +3546,7 @@
           <a:p>
             <a:fld id="{7B78D76A-E6D9-4E40-B7B7-0B4399432C2D}" type="datetimeFigureOut">
               <a:rPr lang="en-US" smtClean="0"/>
-              <a:t>6/21/2024</a:t>
+              <a:t>6/26/2024</a:t>
             </a:fld>
             <a:endParaRPr lang="en-US"/>
           </a:p>
@@ -3784,7 +3792,7 @@
           <a:p>
             <a:fld id="{7B78D76A-E6D9-4E40-B7B7-0B4399432C2D}" type="datetimeFigureOut">
               <a:rPr lang="en-US" smtClean="0"/>
-              <a:t>6/21/2024</a:t>
+              <a:t>6/26/2024</a:t>
             </a:fld>
             <a:endParaRPr lang="en-US"/>
           </a:p>
@@ -4016,7 +4024,7 @@
           <a:p>
             <a:fld id="{7B78D76A-E6D9-4E40-B7B7-0B4399432C2D}" type="datetimeFigureOut">
               <a:rPr lang="en-US" smtClean="0"/>
-              <a:t>6/21/2024</a:t>
+              <a:t>6/26/2024</a:t>
             </a:fld>
             <a:endParaRPr lang="en-US"/>
           </a:p>
@@ -4383,7 +4391,7 @@
           <a:p>
             <a:fld id="{7B78D76A-E6D9-4E40-B7B7-0B4399432C2D}" type="datetimeFigureOut">
               <a:rPr lang="en-US" smtClean="0"/>
-              <a:t>6/21/2024</a:t>
+              <a:t>6/26/2024</a:t>
             </a:fld>
             <a:endParaRPr lang="en-US"/>
           </a:p>
@@ -4501,7 +4509,7 @@
           <a:p>
             <a:fld id="{7B78D76A-E6D9-4E40-B7B7-0B4399432C2D}" type="datetimeFigureOut">
               <a:rPr lang="en-US" smtClean="0"/>
-              <a:t>6/21/2024</a:t>
+              <a:t>6/26/2024</a:t>
             </a:fld>
             <a:endParaRPr lang="en-US"/>
           </a:p>
@@ -4596,7 +4604,7 @@
           <a:p>
             <a:fld id="{7B78D76A-E6D9-4E40-B7B7-0B4399432C2D}" type="datetimeFigureOut">
               <a:rPr lang="en-US" smtClean="0"/>
-              <a:t>6/21/2024</a:t>
+              <a:t>6/26/2024</a:t>
             </a:fld>
             <a:endParaRPr lang="en-US"/>
           </a:p>
@@ -4873,7 +4881,7 @@
           <a:p>
             <a:fld id="{7B78D76A-E6D9-4E40-B7B7-0B4399432C2D}" type="datetimeFigureOut">
               <a:rPr lang="en-US" smtClean="0"/>
-              <a:t>6/21/2024</a:t>
+              <a:t>6/26/2024</a:t>
             </a:fld>
             <a:endParaRPr lang="en-US"/>
           </a:p>
@@ -5130,7 +5138,7 @@
           <a:p>
             <a:fld id="{7B78D76A-E6D9-4E40-B7B7-0B4399432C2D}" type="datetimeFigureOut">
               <a:rPr lang="en-US" smtClean="0"/>
-              <a:t>6/21/2024</a:t>
+              <a:t>6/26/2024</a:t>
             </a:fld>
             <a:endParaRPr lang="en-US"/>
           </a:p>
@@ -5343,7 +5351,7 @@
           <a:p>
             <a:fld id="{7B78D76A-E6D9-4E40-B7B7-0B4399432C2D}" type="datetimeFigureOut">
               <a:rPr lang="en-US" smtClean="0"/>
-              <a:t>6/21/2024</a:t>
+              <a:t>6/26/2024</a:t>
             </a:fld>
             <a:endParaRPr lang="en-US"/>
           </a:p>
@@ -5761,7 +5769,7 @@
           <p:nvPr>
             <p:extLst>
               <p:ext uri="{D42A27DB-BD31-4B8C-83A1-F6EECF244321}">
-                <p14:modId xmlns:p14="http://schemas.microsoft.com/office/powerpoint/2010/main" val="1333338461"/>
+                <p14:modId xmlns:p14="http://schemas.microsoft.com/office/powerpoint/2010/main" val="1945680273"/>
               </p:ext>
             </p:extLst>
           </p:nvPr>

</xml_diff>